<commit_message>
Added some references, added some valuable dataset information and some update to the slides
</commit_message>
<xml_diff>
--- a/Updates/Updates_02_01.pptx
+++ b/Updates/Updates_02_01.pptx
@@ -10,6 +10,7 @@
     <p:sldId id="257" r:id="rId5"/>
     <p:sldId id="258" r:id="rId6"/>
     <p:sldId id="259" r:id="rId7"/>
+    <p:sldId id="260" r:id="rId8"/>
   </p:sldIdLst>
   <p:sldSz cx="10080625" cy="7559675"/>
   <p:notesSz cx="7559675" cy="10691812"/>
@@ -2908,7 +2909,16 @@
                 </a:highlight>
                 <a:latin typeface="Arial"/>
               </a:rPr>
-              <a:t>Click to edit the outline text format</a:t>
+              <a:t>Click to edit the </a:t>
+            </a:r>
+            <a:r>
+              <a:rPr b="0" lang="en-US" sz="3200" spc="-1" strike="noStrike">
+                <a:highlight>
+                  <a:srgbClr val="ffffff"/>
+                </a:highlight>
+                <a:latin typeface="Arial"/>
+              </a:rPr>
+              <a:t>outline text format</a:t>
             </a:r>
             <a:endParaRPr b="0" lang="en-US" sz="3200" spc="-1" strike="noStrike">
               <a:highlight>
@@ -3048,7 +3058,16 @@
                 </a:highlight>
                 <a:latin typeface="Arial"/>
               </a:rPr>
-              <a:t>Sixth Outline Level</a:t>
+              <a:t>Sixth Outline </a:t>
+            </a:r>
+            <a:r>
+              <a:rPr b="0" lang="en-US" sz="2000" spc="-1" strike="noStrike">
+                <a:highlight>
+                  <a:srgbClr val="ffffff"/>
+                </a:highlight>
+                <a:latin typeface="Arial"/>
+              </a:rPr>
+              <a:t>Level</a:t>
             </a:r>
             <a:endParaRPr b="0" lang="en-US" sz="2000" spc="-1" strike="noStrike">
               <a:highlight>
@@ -3076,7 +3095,25 @@
                 </a:highlight>
                 <a:latin typeface="Arial"/>
               </a:rPr>
-              <a:t>Seventh Outline Level</a:t>
+              <a:t>Seventh </a:t>
+            </a:r>
+            <a:r>
+              <a:rPr b="0" lang="en-US" sz="2000" spc="-1" strike="noStrike">
+                <a:highlight>
+                  <a:srgbClr val="ffffff"/>
+                </a:highlight>
+                <a:latin typeface="Arial"/>
+              </a:rPr>
+              <a:t>Outline </a:t>
+            </a:r>
+            <a:r>
+              <a:rPr b="0" lang="en-US" sz="2000" spc="-1" strike="noStrike">
+                <a:highlight>
+                  <a:srgbClr val="ffffff"/>
+                </a:highlight>
+                <a:latin typeface="Arial"/>
+              </a:rPr>
+              <a:t>Level</a:t>
             </a:r>
             <a:endParaRPr b="0" lang="en-US" sz="2000" spc="-1" strike="noStrike">
               <a:highlight>
@@ -3493,7 +3530,7 @@
           </a:bodyPr>
           <a:p>
             <a:pPr algn="r"/>
-            <a:fld id="{A0B0A29D-6F79-4187-98A8-8BF8E90EB71E}" type="slidenum">
+            <a:fld id="{4F6D8BFA-8DA8-4130-A821-110F1A1A3C74}" type="slidenum">
               <a:rPr b="0" lang="en-US" sz="1400" spc="-1" strike="noStrike">
                 <a:latin typeface="Arial"/>
               </a:rPr>
@@ -3771,13 +3808,7 @@
               <a:rPr b="0" lang="en-US" sz="2800" spc="-1" strike="noStrike">
                 <a:latin typeface="Arial"/>
               </a:rPr>
-              <a:t>Total Images : 10199 </a:t>
-            </a:r>
-            <a:r>
-              <a:rPr b="0" lang="en-US" sz="2800" spc="-1" strike="noStrike">
-                <a:latin typeface="Arial"/>
-              </a:rPr>
-              <a:t>images </a:t>
+              <a:t>Total Images : 10199 images </a:t>
             </a:r>
             <a:endParaRPr b="0" lang="en-US" sz="2800" spc="-1" strike="noStrike">
               <a:latin typeface="Arial"/>
@@ -3799,25 +3830,7 @@
               <a:rPr b="0" lang="en-US" sz="2800" spc="-1" strike="noStrike">
                 <a:latin typeface="Arial"/>
               </a:rPr>
-              <a:t>Had to clean up the </a:t>
-            </a:r>
-            <a:r>
-              <a:rPr b="0" lang="en-US" sz="2800" spc="-1" strike="noStrike">
-                <a:latin typeface="Arial"/>
-              </a:rPr>
-              <a:t>dataset. Few images </a:t>
-            </a:r>
-            <a:r>
-              <a:rPr b="0" lang="en-US" sz="2800" spc="-1" strike="noStrike">
-                <a:latin typeface="Arial"/>
-              </a:rPr>
-              <a:t>that were not clear </a:t>
-            </a:r>
-            <a:r>
-              <a:rPr b="0" lang="en-US" sz="2800" spc="-1" strike="noStrike">
-                <a:latin typeface="Arial"/>
-              </a:rPr>
-              <a:t>and had issues.</a:t>
+              <a:t>Had to clean up the dataset. Few images that were not clear and had issues.</a:t>
             </a:r>
             <a:endParaRPr b="0" lang="en-US" sz="2800" spc="-1" strike="noStrike">
               <a:latin typeface="Arial"/>
@@ -3839,19 +3852,7 @@
               <a:rPr b="0" lang="en-US" sz="2800" spc="-1" strike="noStrike">
                 <a:latin typeface="Arial"/>
               </a:rPr>
-              <a:t>Removed those </a:t>
-            </a:r>
-            <a:r>
-              <a:rPr b="0" lang="en-US" sz="2800" spc="-1" strike="noStrike">
-                <a:latin typeface="Arial"/>
-              </a:rPr>
-              <a:t>images and we got </a:t>
-            </a:r>
-            <a:r>
-              <a:rPr b="0" lang="en-US" sz="2800" spc="-1" strike="noStrike">
-                <a:latin typeface="Arial"/>
-              </a:rPr>
-              <a:t>10138 images.</a:t>
+              <a:t>Removed those images and we got 10138 images.</a:t>
             </a:r>
             <a:endParaRPr b="0" lang="en-US" sz="2800" spc="-1" strike="noStrike">
               <a:latin typeface="Arial"/>
@@ -3873,19 +3874,7 @@
               <a:rPr b="0" lang="en-US" sz="2800" spc="-1" strike="noStrike">
                 <a:latin typeface="Arial"/>
               </a:rPr>
-              <a:t>Left eye and right eye </a:t>
-            </a:r>
-            <a:r>
-              <a:rPr b="0" lang="en-US" sz="2800" spc="-1" strike="noStrike">
-                <a:latin typeface="Arial"/>
-              </a:rPr>
-              <a:t>folders are separated </a:t>
-            </a:r>
-            <a:r>
-              <a:rPr b="0" lang="en-US" sz="2800" spc="-1" strike="noStrike">
-                <a:latin typeface="Arial"/>
-              </a:rPr>
-              <a:t>for each subject. </a:t>
+              <a:t>Left eye and right eye folders are separated for each subject. </a:t>
             </a:r>
             <a:endParaRPr b="0" lang="en-US" sz="2800" spc="-1" strike="noStrike">
               <a:latin typeface="Arial"/>
@@ -3907,37 +3896,7 @@
               <a:rPr b="0" lang="en-US" sz="2800" spc="-1" strike="noStrike">
                 <a:latin typeface="Arial"/>
               </a:rPr>
-              <a:t>There was an overlap </a:t>
-            </a:r>
-            <a:r>
-              <a:rPr b="0" lang="en-US" sz="2800" spc="-1" strike="noStrike">
-                <a:latin typeface="Arial"/>
-              </a:rPr>
-              <a:t>of 3 images, which </a:t>
-            </a:r>
-            <a:r>
-              <a:rPr b="0" lang="en-US" sz="2800" spc="-1" strike="noStrike">
-                <a:latin typeface="Arial"/>
-              </a:rPr>
-              <a:t>means left eye folder </a:t>
-            </a:r>
-            <a:r>
-              <a:rPr b="0" lang="en-US" sz="2800" spc="-1" strike="noStrike">
-                <a:latin typeface="Arial"/>
-              </a:rPr>
-              <a:t>of a subject had a </a:t>
-            </a:r>
-            <a:r>
-              <a:rPr b="0" lang="en-US" sz="2800" spc="-1" strike="noStrike">
-                <a:latin typeface="Arial"/>
-              </a:rPr>
-              <a:t>right eye image or </a:t>
-            </a:r>
-            <a:r>
-              <a:rPr b="0" lang="en-US" sz="2800" spc="-1" strike="noStrike">
-                <a:latin typeface="Arial"/>
-              </a:rPr>
-              <a:t>vice versa.</a:t>
+              <a:t>There was an overlap of 3 images, which means left eye folder of a subject had a right eye image or vice versa.</a:t>
             </a:r>
             <a:endParaRPr b="0" lang="en-US" sz="2800" spc="-1" strike="noStrike">
               <a:latin typeface="Arial"/>
@@ -3959,31 +3918,7 @@
               <a:rPr b="0" lang="en-US" sz="2800" spc="-1" strike="noStrike">
                 <a:latin typeface="Arial"/>
               </a:rPr>
-              <a:t>Such images have </a:t>
-            </a:r>
-            <a:r>
-              <a:rPr b="0" lang="en-US" sz="2800" spc="-1" strike="noStrike">
-                <a:latin typeface="Arial"/>
-              </a:rPr>
-              <a:t>been discarded. </a:t>
-            </a:r>
-            <a:r>
-              <a:rPr b="0" lang="en-US" sz="2800" spc="-1" strike="noStrike">
-                <a:latin typeface="Arial"/>
-              </a:rPr>
-              <a:t>Therefore total </a:t>
-            </a:r>
-            <a:r>
-              <a:rPr b="0" lang="en-US" sz="2800" spc="-1" strike="noStrike">
-                <a:latin typeface="Arial"/>
-              </a:rPr>
-              <a:t>number of images is </a:t>
-            </a:r>
-            <a:r>
-              <a:rPr b="0" lang="en-US" sz="2800" spc="-1" strike="noStrike">
-                <a:latin typeface="Arial"/>
-              </a:rPr>
-              <a:t>down to 10,135 now. </a:t>
+              <a:t>Such images have been discarded. Therefore total number of images is down to 10,135 now. </a:t>
             </a:r>
             <a:endParaRPr b="0" lang="en-US" sz="2800" spc="-1" strike="noStrike">
               <a:latin typeface="Arial"/>
@@ -4005,31 +3940,7 @@
               <a:rPr b="0" lang="en-US" sz="2800" spc="-1" strike="noStrike">
                 <a:latin typeface="Arial"/>
               </a:rPr>
-              <a:t>The total number of  </a:t>
-            </a:r>
-            <a:r>
-              <a:rPr b="0" lang="en-US" sz="2800" spc="-1" strike="noStrike">
-                <a:latin typeface="Arial"/>
-              </a:rPr>
-              <a:t>folders were 504. </a:t>
-            </a:r>
-            <a:r>
-              <a:rPr b="0" lang="en-US" sz="2800" spc="-1" strike="noStrike">
-                <a:latin typeface="Arial"/>
-              </a:rPr>
-              <a:t>Number of left eye </a:t>
-            </a:r>
-            <a:r>
-              <a:rPr b="0" lang="en-US" sz="2800" spc="-1" strike="noStrike">
-                <a:latin typeface="Arial"/>
-              </a:rPr>
-              <a:t>and right eyes are </a:t>
-            </a:r>
-            <a:r>
-              <a:rPr b="0" lang="en-US" sz="2800" spc="-1" strike="noStrike">
-                <a:latin typeface="Arial"/>
-              </a:rPr>
-              <a:t>equal to 252 each. </a:t>
+              <a:t>The total number of  folders were 504. Number of left eye and right eyes are equal to 252 each. </a:t>
             </a:r>
             <a:endParaRPr b="0" lang="en-US" sz="2800" spc="-1" strike="noStrike">
               <a:latin typeface="Arial"/>
@@ -4051,31 +3962,7 @@
               <a:rPr b="0" lang="en-US" sz="2800" spc="-1" strike="noStrike">
                 <a:latin typeface="Arial"/>
               </a:rPr>
-              <a:t>Based on having </a:t>
-            </a:r>
-            <a:r>
-              <a:rPr b="0" lang="en-US" sz="2800" spc="-1" strike="noStrike">
-                <a:latin typeface="Arial"/>
-              </a:rPr>
-              <a:t>equal number of left </a:t>
-            </a:r>
-            <a:r>
-              <a:rPr b="0" lang="en-US" sz="2800" spc="-1" strike="noStrike">
-                <a:latin typeface="Arial"/>
-              </a:rPr>
-              <a:t>and right eye, we are </a:t>
-            </a:r>
-            <a:r>
-              <a:rPr b="0" lang="en-US" sz="2800" spc="-1" strike="noStrike">
-                <a:latin typeface="Arial"/>
-              </a:rPr>
-              <a:t>assuming number of </a:t>
-            </a:r>
-            <a:r>
-              <a:rPr b="0" lang="en-US" sz="2800" spc="-1" strike="noStrike">
-                <a:latin typeface="Arial"/>
-              </a:rPr>
-              <a:t>subjects as 252</a:t>
+              <a:t>Based on having equal number of left and right eye, we are assuming number of subjects as 252</a:t>
             </a:r>
             <a:endParaRPr b="0" lang="en-US" sz="2800" spc="-1" strike="noStrike">
               <a:latin typeface="Arial"/>
@@ -4097,13 +3984,7 @@
               <a:rPr b="0" lang="en-US" sz="2800" spc="-1" strike="noStrike">
                 <a:latin typeface="Arial"/>
               </a:rPr>
-              <a:t>The males are 181, </a:t>
-            </a:r>
-            <a:r>
-              <a:rPr b="0" lang="en-US" sz="2800" spc="-1" strike="noStrike">
-                <a:latin typeface="Arial"/>
-              </a:rPr>
-              <a:t>and females are 71</a:t>
+              <a:t>The males are 181, and females are 71</a:t>
             </a:r>
             <a:endParaRPr b="0" lang="en-US" sz="2800" spc="-1" strike="noStrike">
               <a:latin typeface="Arial"/>
@@ -4125,43 +4006,7 @@
               <a:rPr b="0" lang="en-US" sz="2800" spc="-1" strike="noStrike">
                 <a:latin typeface="Arial"/>
               </a:rPr>
-              <a:t>Images have been </a:t>
-            </a:r>
-            <a:r>
-              <a:rPr b="0" lang="en-US" sz="2800" spc="-1" strike="noStrike">
-                <a:latin typeface="Arial"/>
-              </a:rPr>
-              <a:t>taken at 5 distances, </a:t>
-            </a:r>
-            <a:r>
-              <a:rPr b="0" lang="en-US" sz="2800" spc="-1" strike="noStrike">
-                <a:latin typeface="Arial"/>
-              </a:rPr>
-              <a:t>so the image sizes (h </a:t>
-            </a:r>
-            <a:r>
-              <a:rPr b="0" lang="en-US" sz="2800" spc="-1" strike="noStrike">
-                <a:latin typeface="Arial"/>
-              </a:rPr>
-              <a:t>x w) are (401 x 501),</a:t>
-            </a:r>
-            <a:r>
-              <a:rPr b="0" lang="en-US" sz="2800" spc="-1" strike="noStrike">
-                <a:latin typeface="Arial"/>
-              </a:rPr>
-              <a:t>(441 x 561), (501 x </a:t>
-            </a:r>
-            <a:r>
-              <a:rPr b="0" lang="en-US" sz="2800" spc="-1" strike="noStrike">
-                <a:latin typeface="Arial"/>
-              </a:rPr>
-              <a:t>651),(651 x 801), (801 </a:t>
-            </a:r>
-            <a:r>
-              <a:rPr b="0" lang="en-US" sz="2800" spc="-1" strike="noStrike">
-                <a:latin typeface="Arial"/>
-              </a:rPr>
-              <a:t>x 1001).</a:t>
+              <a:t>Images have been taken at 5 distances, so the image sizes (h x w) are (401 x 501),(441 x 561), (501 x 651),(651 x 801), (801 x 1001).</a:t>
             </a:r>
             <a:endParaRPr b="0" lang="en-US" sz="2800" spc="-1" strike="noStrike">
               <a:latin typeface="Arial"/>
@@ -4183,55 +4028,7 @@
               <a:rPr b="0" lang="en-US" sz="2800" spc="-1" strike="noStrike">
                 <a:latin typeface="Arial"/>
               </a:rPr>
-              <a:t>There are 3 images </a:t>
-            </a:r>
-            <a:r>
-              <a:rPr b="0" lang="en-US" sz="2800" spc="-1" strike="noStrike">
-                <a:latin typeface="Arial"/>
-              </a:rPr>
-              <a:t>for each image size. </a:t>
-            </a:r>
-            <a:r>
-              <a:rPr b="0" lang="en-US" sz="2800" spc="-1" strike="noStrike">
-                <a:latin typeface="Arial"/>
-              </a:rPr>
-              <a:t>Therefore each folder </a:t>
-            </a:r>
-            <a:r>
-              <a:rPr b="0" lang="en-US" sz="2800" spc="-1" strike="noStrike">
-                <a:latin typeface="Arial"/>
-              </a:rPr>
-              <a:t>has 15 images, if one </a:t>
-            </a:r>
-            <a:r>
-              <a:rPr b="0" lang="en-US" sz="2800" spc="-1" strike="noStrike">
-                <a:latin typeface="Arial"/>
-              </a:rPr>
-              <a:t>session. Some of the </a:t>
-            </a:r>
-            <a:r>
-              <a:rPr b="0" lang="en-US" sz="2800" spc="-1" strike="noStrike">
-                <a:latin typeface="Arial"/>
-              </a:rPr>
-              <a:t>images have 2 </a:t>
-            </a:r>
-            <a:r>
-              <a:rPr b="0" lang="en-US" sz="2800" spc="-1" strike="noStrike">
-                <a:latin typeface="Arial"/>
-              </a:rPr>
-              <a:t>sessions, which </a:t>
-            </a:r>
-            <a:r>
-              <a:rPr b="0" lang="en-US" sz="2800" spc="-1" strike="noStrike">
-                <a:latin typeface="Arial"/>
-              </a:rPr>
-              <a:t>means upto 30 </a:t>
-            </a:r>
-            <a:r>
-              <a:rPr b="0" lang="en-US" sz="2800" spc="-1" strike="noStrike">
-                <a:latin typeface="Arial"/>
-              </a:rPr>
-              <a:t>images in each folder.</a:t>
+              <a:t>There are 3 images for each image size. Therefore each folder has 15 images, if one session. Some of the images have 2 sessions, which means upto 30 images in each folder.</a:t>
             </a:r>
             <a:endParaRPr b="0" lang="en-US" sz="2800" spc="-1" strike="noStrike">
               <a:latin typeface="Arial"/>
@@ -4862,7 +4659,29 @@
               <a:rPr b="0" lang="en-US" sz="1400" spc="-1" strike="noStrike">
                 <a:latin typeface="Arial"/>
               </a:rPr>
-              <a:t>Use a balanced batch size for male and female  </a:t>
+              <a:t>Train the VGG 19 convolutional layers along with GAP layer and couple of linear layers and Softmax for periocular recognition </a:t>
+            </a:r>
+            <a:endParaRPr b="0" lang="en-US" sz="1400" spc="-1" strike="noStrike">
+              <a:latin typeface="Arial"/>
+            </a:endParaRPr>
+          </a:p>
+          <a:p>
+            <a:pPr marL="432000" indent="-324000">
+              <a:spcBef>
+                <a:spcPts val="1414"/>
+              </a:spcBef>
+              <a:buClr>
+                <a:srgbClr val="ff6600"/>
+              </a:buClr>
+              <a:buSzPct val="45000"/>
+              <a:buFont typeface="Wingdings" charset="2"/>
+              <a:buChar char=""/>
+            </a:pPr>
+            <a:r>
+              <a:rPr b="0" lang="en-US" sz="1400" spc="-1" strike="noStrike">
+                <a:latin typeface="Arial"/>
+              </a:rPr>
+              <a:t>After training periocular net, train multi-class classification network for attribute classification. </a:t>
             </a:r>
             <a:endParaRPr b="0" lang="en-US" sz="1400" spc="-1" strike="noStrike">
               <a:latin typeface="Arial"/>
@@ -4884,12 +4703,170 @@
               <a:rPr b="0" lang="en-US" sz="1400" spc="-1" strike="noStrike">
                 <a:latin typeface="Arial"/>
               </a:rPr>
-              <a:t>Train the VGG 19 convolutional layers along with GAP layer and couple of linear layers and Softmax for periocular recognition </a:t>
+              <a:t>For UBIPr we have only genders annotated, we do not have ethnicity.</a:t>
             </a:r>
             <a:endParaRPr b="0" lang="en-US" sz="1400" spc="-1" strike="noStrike">
               <a:latin typeface="Arial"/>
             </a:endParaRPr>
           </a:p>
+          <a:p>
+            <a:pPr lvl="1" marL="864000" indent="-324000">
+              <a:spcBef>
+                <a:spcPts val="1134"/>
+              </a:spcBef>
+              <a:buClr>
+                <a:srgbClr val="ff6600"/>
+              </a:buClr>
+              <a:buSzPct val="75000"/>
+              <a:buFont typeface="Symbol" charset="2"/>
+              <a:buChar char=""/>
+            </a:pPr>
+            <a:r>
+              <a:rPr b="0" lang="en-US" sz="1400" spc="-1" strike="noStrike">
+                <a:latin typeface="Arial"/>
+              </a:rPr>
+              <a:t>For Cross-Eyed, we have no attribute annotations.</a:t>
+            </a:r>
+            <a:endParaRPr b="0" lang="en-US" sz="1400" spc="-1" strike="noStrike">
+              <a:latin typeface="Arial"/>
+            </a:endParaRPr>
+          </a:p>
+          <a:p>
+            <a:pPr lvl="1" marL="864000" indent="-324000">
+              <a:spcBef>
+                <a:spcPts val="1134"/>
+              </a:spcBef>
+              <a:buClr>
+                <a:srgbClr val="ff6600"/>
+              </a:buClr>
+              <a:buSzPct val="75000"/>
+              <a:buFont typeface="Symbol" charset="2"/>
+              <a:buChar char=""/>
+            </a:pPr>
+            <a:r>
+              <a:rPr b="0" lang="en-US" sz="1400" spc="-1" strike="noStrike">
+                <a:latin typeface="Arial"/>
+              </a:rPr>
+              <a:t> </a:t>
+            </a:r>
+            <a:endParaRPr b="0" lang="en-US" sz="1400" spc="-1" strike="noStrike">
+              <a:latin typeface="Arial"/>
+            </a:endParaRPr>
+          </a:p>
+          <a:p>
+            <a:pPr lvl="1" marL="864000" indent="-324000">
+              <a:spcBef>
+                <a:spcPts val="1134"/>
+              </a:spcBef>
+              <a:buClr>
+                <a:srgbClr val="ff6600"/>
+              </a:buClr>
+              <a:buSzPct val="75000"/>
+              <a:buFont typeface="Symbol" charset="2"/>
+              <a:buChar char=""/>
+            </a:pPr>
+            <a:endParaRPr b="0" lang="en-US" sz="1400" spc="-1" strike="noStrike">
+              <a:latin typeface="Arial"/>
+            </a:endParaRPr>
+          </a:p>
+        </p:txBody>
+      </p:sp>
+    </p:spTree>
+  </p:cSld>
+  <mc:AlternateContent>
+    <mc:Choice Requires="p14">
+      <p:transition spd="slow" p14:dur="2000"/>
+    </mc:Choice>
+    <mc:Fallback>
+      <p:transition spd="slow"/>
+    </mc:Fallback>
+  </mc:AlternateContent>
+</p:sld>
+</file>
+
+<file path=ppt/slides/slide5.xml><?xml version="1.0" encoding="utf-8"?>
+<p:sld xmlns:a="http://schemas.openxmlformats.org/drawingml/2006/main" xmlns:p="http://schemas.openxmlformats.org/presentationml/2006/main" xmlns:r="http://schemas.openxmlformats.org/officeDocument/2006/relationships" xmlns:p14="http://schemas.microsoft.com/office/powerpoint/2010/main" xmlns:p15="http://schemas.microsoft.com/office/powerpoint/2012/main" xmlns:mc="http://schemas.openxmlformats.org/markup-compatibility/2006">
+  <p:cSld>
+    <p:spTree>
+      <p:nvGrpSpPr>
+        <p:cNvPr id="1" name=""/>
+        <p:cNvGrpSpPr/>
+        <p:nvPr/>
+      </p:nvGrpSpPr>
+      <p:grpSpPr>
+        <a:xfrm>
+          <a:off x="0" y="0"/>
+          <a:ext cx="0" cy="0"/>
+          <a:chOff x="0" y="0"/>
+          <a:chExt cx="0" cy="0"/>
+        </a:xfrm>
+      </p:grpSpPr>
+      <p:sp>
+        <p:nvSpPr>
+          <p:cNvPr id="97" name="TextShape 1"/>
+          <p:cNvSpPr txBox="1"/>
+          <p:nvPr/>
+        </p:nvSpPr>
+        <p:spPr>
+          <a:xfrm>
+            <a:off x="504000" y="301320"/>
+            <a:ext cx="8208000" cy="745200"/>
+          </a:xfrm>
+          <a:prstGeom prst="rect">
+            <a:avLst/>
+          </a:prstGeom>
+          <a:noFill/>
+          <a:ln>
+            <a:noFill/>
+          </a:ln>
+        </p:spPr>
+        <p:txBody>
+          <a:bodyPr lIns="0" rIns="0" tIns="0" bIns="0" anchor="ctr">
+            <a:noAutofit/>
+          </a:bodyPr>
+          <a:p>
+            <a:pPr algn="ctr"/>
+            <a:r>
+              <a:rPr b="0" lang="en-US" sz="3600" spc="-1" strike="noStrike">
+                <a:solidFill>
+                  <a:srgbClr val="ff6600"/>
+                </a:solidFill>
+                <a:latin typeface="Arial"/>
+              </a:rPr>
+              <a:t>Research Plan</a:t>
+            </a:r>
+            <a:endParaRPr b="0" lang="en-US" sz="3600" spc="-1" strike="noStrike">
+              <a:solidFill>
+                <a:srgbClr val="ff6600"/>
+              </a:solidFill>
+              <a:latin typeface="Arial"/>
+            </a:endParaRPr>
+          </a:p>
+        </p:txBody>
+      </p:sp>
+      <p:sp>
+        <p:nvSpPr>
+          <p:cNvPr id="98" name="TextShape 2"/>
+          <p:cNvSpPr txBox="1"/>
+          <p:nvPr/>
+        </p:nvSpPr>
+        <p:spPr>
+          <a:xfrm>
+            <a:off x="504000" y="1769040"/>
+            <a:ext cx="9071640" cy="5065560"/>
+          </a:xfrm>
+          <a:prstGeom prst="rect">
+            <a:avLst/>
+          </a:prstGeom>
+          <a:noFill/>
+          <a:ln>
+            <a:noFill/>
+          </a:ln>
+        </p:spPr>
+        <p:txBody>
+          <a:bodyPr lIns="0" rIns="0" tIns="0" bIns="0">
+            <a:normAutofit/>
+          </a:bodyPr>
           <a:p>
             <a:pPr marL="432000" indent="-324000">
               <a:spcBef>
@@ -4902,13 +4879,7 @@
               <a:buFont typeface="Wingdings" charset="2"/>
               <a:buChar char=""/>
             </a:pPr>
-            <a:r>
-              <a:rPr b="0" lang="en-US" sz="1400" spc="-1" strike="noStrike">
-                <a:latin typeface="Arial"/>
-              </a:rPr>
-              <a:t>After training periocular net, train multi-class classification network for attribute classification. </a:t>
-            </a:r>
-            <a:endParaRPr b="0" lang="en-US" sz="1400" spc="-1" strike="noStrike">
+            <a:endParaRPr b="0" lang="en-US" sz="3200" spc="-1" strike="noStrike">
               <a:latin typeface="Arial"/>
             </a:endParaRPr>
           </a:p>
@@ -4928,8 +4899,134 @@
               <a:rPr b="0" lang="en-US" sz="1400" spc="-1" strike="noStrike">
                 <a:latin typeface="Arial"/>
               </a:rPr>
-              <a:t>For UBIPr we have only genders annotated, we do not have ethnicity.</a:t>
-            </a:r>
+              <a:t>Tasks:</a:t>
+            </a:r>
+            <a:endParaRPr b="0" lang="en-US" sz="1400" spc="-1" strike="noStrike">
+              <a:latin typeface="Arial"/>
+            </a:endParaRPr>
+          </a:p>
+          <a:p>
+            <a:pPr lvl="2" marL="1296000" indent="-288000">
+              <a:spcBef>
+                <a:spcPts val="850"/>
+              </a:spcBef>
+              <a:buClr>
+                <a:srgbClr val="ff6600"/>
+              </a:buClr>
+              <a:buSzPct val="45000"/>
+              <a:buFont typeface="Wingdings" charset="2"/>
+              <a:buChar char=""/>
+            </a:pPr>
+            <a:r>
+              <a:rPr b="0" lang="en-US" sz="1400" spc="-1" strike="noStrike">
+                <a:latin typeface="Arial"/>
+              </a:rPr>
+              <a:t>Perform it only for one eye (Done)</a:t>
+            </a:r>
+            <a:endParaRPr b="0" lang="en-US" sz="1400" spc="-1" strike="noStrike">
+              <a:latin typeface="Arial"/>
+            </a:endParaRPr>
+          </a:p>
+          <a:p>
+            <a:pPr lvl="2" marL="1296000" indent="-288000">
+              <a:spcBef>
+                <a:spcPts val="850"/>
+              </a:spcBef>
+              <a:buClr>
+                <a:srgbClr val="ff6600"/>
+              </a:buClr>
+              <a:buSzPct val="45000"/>
+              <a:buFont typeface="Wingdings" charset="2"/>
+              <a:buChar char=""/>
+            </a:pPr>
+            <a:r>
+              <a:rPr b="0" lang="en-US" sz="1400" spc="-1" strike="noStrike">
+                <a:latin typeface="Arial"/>
+              </a:rPr>
+              <a:t>Resize all the images to 401 x 501 (Done on the fly in Pytorch) </a:t>
+            </a:r>
+            <a:endParaRPr b="0" lang="en-US" sz="1400" spc="-1" strike="noStrike">
+              <a:latin typeface="Arial"/>
+            </a:endParaRPr>
+          </a:p>
+          <a:p>
+            <a:pPr lvl="2" marL="1296000" indent="-288000">
+              <a:spcBef>
+                <a:spcPts val="850"/>
+              </a:spcBef>
+              <a:buClr>
+                <a:srgbClr val="ff6600"/>
+              </a:buClr>
+              <a:buSzPct val="45000"/>
+              <a:buFont typeface="Wingdings" charset="2"/>
+              <a:buChar char=""/>
+            </a:pPr>
+            <a:r>
+              <a:rPr b="0" lang="en-US" sz="1400" spc="-1" strike="noStrike">
+                <a:latin typeface="Arial"/>
+              </a:rPr>
+              <a:t>Take a look at Daemon Woodard papers.</a:t>
+            </a:r>
+            <a:endParaRPr b="0" lang="en-US" sz="1400" spc="-1" strike="noStrike">
+              <a:latin typeface="Arial"/>
+            </a:endParaRPr>
+          </a:p>
+          <a:p>
+            <a:pPr lvl="2" marL="1296000" indent="-288000">
+              <a:spcBef>
+                <a:spcPts val="850"/>
+              </a:spcBef>
+              <a:buClr>
+                <a:srgbClr val="ff6600"/>
+              </a:buClr>
+              <a:buSzPct val="45000"/>
+              <a:buFont typeface="Wingdings" charset="2"/>
+              <a:buChar char=""/>
+            </a:pPr>
+            <a:r>
+              <a:rPr b="0" lang="en-US" sz="1400" spc="-1" strike="noStrike">
+                <a:latin typeface="Arial"/>
+              </a:rPr>
+              <a:t>Ask Moktari for Honk Kong Polytechnic dataset.</a:t>
+            </a:r>
+            <a:endParaRPr b="0" lang="en-US" sz="1400" spc="-1" strike="noStrike">
+              <a:latin typeface="Arial"/>
+            </a:endParaRPr>
+          </a:p>
+          <a:p>
+            <a:pPr lvl="2" marL="1296000" indent="-288000">
+              <a:spcBef>
+                <a:spcPts val="850"/>
+              </a:spcBef>
+              <a:buClr>
+                <a:srgbClr val="ff6600"/>
+              </a:buClr>
+              <a:buSzPct val="45000"/>
+              <a:buFont typeface="Wingdings" charset="2"/>
+              <a:buChar char=""/>
+            </a:pPr>
+            <a:r>
+              <a:rPr b="0" lang="en-US" sz="1400" spc="-1" strike="noStrike">
+                <a:latin typeface="Arial"/>
+              </a:rPr>
+              <a:t>Use a balanced batch size for male and female (Remember to test it later)  </a:t>
+            </a:r>
+            <a:endParaRPr b="0" lang="en-US" sz="1400" spc="-1" strike="noStrike">
+              <a:latin typeface="Arial"/>
+            </a:endParaRPr>
+          </a:p>
+          <a:p>
+            <a:pPr marL="432000" indent="-324000">
+              <a:spcBef>
+                <a:spcPts val="1414"/>
+              </a:spcBef>
+              <a:buClr>
+                <a:srgbClr val="ff6600"/>
+              </a:buClr>
+              <a:buSzPct val="45000"/>
+              <a:buFont typeface="Wingdings" charset="2"/>
+              <a:buChar char=""/>
+            </a:pPr>
             <a:endParaRPr b="0" lang="en-US" sz="1400" spc="-1" strike="noStrike">
               <a:latin typeface="Arial"/>
             </a:endParaRPr>
@@ -4945,138 +5042,6 @@
               <a:buSzPct val="75000"/>
               <a:buFont typeface="Symbol" charset="2"/>
               <a:buChar char=""/>
-            </a:pPr>
-            <a:r>
-              <a:rPr b="0" lang="en-US" sz="1400" spc="-1" strike="noStrike">
-                <a:latin typeface="Arial"/>
-              </a:rPr>
-              <a:t>For Cross-Eyed, we have no attribute annotations.</a:t>
-            </a:r>
-            <a:endParaRPr b="0" lang="en-US" sz="1400" spc="-1" strike="noStrike">
-              <a:latin typeface="Arial"/>
-            </a:endParaRPr>
-          </a:p>
-          <a:p>
-            <a:pPr lvl="1" marL="864000" indent="-324000">
-              <a:spcBef>
-                <a:spcPts val="1134"/>
-              </a:spcBef>
-              <a:buClr>
-                <a:srgbClr val="ff6600"/>
-              </a:buClr>
-              <a:buSzPct val="75000"/>
-              <a:buFont typeface="Symbol" charset="2"/>
-              <a:buChar char=""/>
-            </a:pPr>
-            <a:r>
-              <a:rPr b="0" lang="en-US" sz="1400" spc="-1" strike="noStrike">
-                <a:latin typeface="Arial"/>
-              </a:rPr>
-              <a:t>Tasks:</a:t>
-            </a:r>
-            <a:endParaRPr b="0" lang="en-US" sz="1400" spc="-1" strike="noStrike">
-              <a:latin typeface="Arial"/>
-            </a:endParaRPr>
-          </a:p>
-          <a:p>
-            <a:pPr lvl="2" marL="1296000" indent="-288000">
-              <a:spcBef>
-                <a:spcPts val="850"/>
-              </a:spcBef>
-              <a:buClr>
-                <a:srgbClr val="ff6600"/>
-              </a:buClr>
-              <a:buSzPct val="45000"/>
-              <a:buFont typeface="Wingdings" charset="2"/>
-              <a:buChar char=""/>
-            </a:pPr>
-            <a:r>
-              <a:rPr b="0" lang="en-US" sz="1400" spc="-1" strike="noStrike">
-                <a:latin typeface="Arial"/>
-              </a:rPr>
-              <a:t>Perform it only for one eye</a:t>
-            </a:r>
-            <a:endParaRPr b="0" lang="en-US" sz="1400" spc="-1" strike="noStrike">
-              <a:latin typeface="Arial"/>
-            </a:endParaRPr>
-          </a:p>
-          <a:p>
-            <a:pPr lvl="2" marL="1296000" indent="-288000">
-              <a:spcBef>
-                <a:spcPts val="850"/>
-              </a:spcBef>
-              <a:buClr>
-                <a:srgbClr val="ff6600"/>
-              </a:buClr>
-              <a:buSzPct val="45000"/>
-              <a:buFont typeface="Wingdings" charset="2"/>
-              <a:buChar char=""/>
-            </a:pPr>
-            <a:r>
-              <a:rPr b="0" lang="en-US" sz="1400" spc="-1" strike="noStrike">
-                <a:latin typeface="Arial"/>
-              </a:rPr>
-              <a:t>Resize all the images to 401 x 501 </a:t>
-            </a:r>
-            <a:endParaRPr b="0" lang="en-US" sz="1400" spc="-1" strike="noStrike">
-              <a:latin typeface="Arial"/>
-            </a:endParaRPr>
-          </a:p>
-          <a:p>
-            <a:pPr lvl="2" marL="1296000" indent="-288000">
-              <a:spcBef>
-                <a:spcPts val="850"/>
-              </a:spcBef>
-              <a:buClr>
-                <a:srgbClr val="ff6600"/>
-              </a:buClr>
-              <a:buSzPct val="45000"/>
-              <a:buFont typeface="Wingdings" charset="2"/>
-              <a:buChar char=""/>
-            </a:pPr>
-            <a:r>
-              <a:rPr b="0" lang="en-US" sz="1400" spc="-1" strike="noStrike">
-                <a:latin typeface="Arial"/>
-              </a:rPr>
-              <a:t>Take a look at Daemon Woodard papers.</a:t>
-            </a:r>
-            <a:endParaRPr b="0" lang="en-US" sz="1400" spc="-1" strike="noStrike">
-              <a:latin typeface="Arial"/>
-            </a:endParaRPr>
-          </a:p>
-          <a:p>
-            <a:pPr lvl="2" marL="1296000" indent="-288000">
-              <a:spcBef>
-                <a:spcPts val="850"/>
-              </a:spcBef>
-              <a:buClr>
-                <a:srgbClr val="ff6600"/>
-              </a:buClr>
-              <a:buSzPct val="45000"/>
-              <a:buFont typeface="Wingdings" charset="2"/>
-              <a:buChar char=""/>
-            </a:pPr>
-            <a:r>
-              <a:rPr b="0" lang="en-US" sz="1400" spc="-1" strike="noStrike">
-                <a:latin typeface="Arial"/>
-              </a:rPr>
-              <a:t>Ask Moktari for Honk Kong Polytechnic dataset.</a:t>
-            </a:r>
-            <a:endParaRPr b="0" lang="en-US" sz="1400" spc="-1" strike="noStrike">
-              <a:latin typeface="Arial"/>
-            </a:endParaRPr>
-          </a:p>
-          <a:p>
-            <a:pPr marL="432000" indent="-324000">
-              <a:spcBef>
-                <a:spcPts val="1414"/>
-              </a:spcBef>
-              <a:buClr>
-                <a:srgbClr val="ff6600"/>
-              </a:buClr>
-              <a:buSzPct val="45000"/>
-              <a:buFont typeface="Wingdings" charset="2"/>
-              <a:buChar char=""/>
             </a:pPr>
             <a:endParaRPr b="0" lang="en-US" sz="1400" spc="-1" strike="noStrike">
               <a:latin typeface="Arial"/>

</xml_diff>